<commit_message>
Added slides on OReilly books, Sklearn workshop
</commit_message>
<xml_diff>
--- a/talks/20170413/20170413-PyDataIntro.pptx
+++ b/talks/20170413/20170413-PyDataIntro.pptx
@@ -5,10 +5,10 @@
     <p:sldMasterId id="2147483648" r:id="rId1"/>
   </p:sldMasterIdLst>
   <p:notesMasterIdLst>
-    <p:notesMasterId r:id="rId10"/>
+    <p:notesMasterId r:id="rId12"/>
   </p:notesMasterIdLst>
   <p:handoutMasterIdLst>
-    <p:handoutMasterId r:id="rId11"/>
+    <p:handoutMasterId r:id="rId13"/>
   </p:handoutMasterIdLst>
   <p:sldIdLst>
     <p:sldId id="256" r:id="rId2"/>
@@ -18,7 +18,9 @@
     <p:sldId id="261" r:id="rId6"/>
     <p:sldId id="263" r:id="rId7"/>
     <p:sldId id="262" r:id="rId8"/>
-    <p:sldId id="264" r:id="rId9"/>
+    <p:sldId id="265" r:id="rId9"/>
+    <p:sldId id="266" r:id="rId10"/>
+    <p:sldId id="264" r:id="rId11"/>
   </p:sldIdLst>
   <p:sldSz cx="9144000" cy="6858000" type="screen4x3"/>
   <p:notesSz cx="6858000" cy="9144000"/>
@@ -202,7 +204,7 @@
           <a:p>
             <a:fld id="{FEB69ECD-F9AB-FC4E-90AC-326AAAF914AC}" type="datetimeFigureOut">
               <a:rPr lang="en-US" smtClean="0"/>
-              <a:t>4/10/17</a:t>
+              <a:t>4/11/17</a:t>
             </a:fld>
             <a:endParaRPr lang="en-US"/>
           </a:p>
@@ -367,7 +369,7 @@
           <a:p>
             <a:fld id="{12EC9BAA-1B7E-A446-A2B3-00C89FDCBD52}" type="datetimeFigureOut">
               <a:rPr lang="en-US" smtClean="0"/>
-              <a:t>4/10/17</a:t>
+              <a:t>4/11/17</a:t>
             </a:fld>
             <a:endParaRPr lang="en-US"/>
           </a:p>
@@ -917,7 +919,7 @@
           <a:p>
             <a:fld id="{764FC402-F86F-7E47-81B8-16B12E4887E4}" type="datetimeFigureOut">
               <a:rPr lang="en-US" smtClean="0"/>
-              <a:t>4/10/17</a:t>
+              <a:t>4/11/17</a:t>
             </a:fld>
             <a:endParaRPr lang="en-US"/>
           </a:p>
@@ -1087,7 +1089,7 @@
           <a:p>
             <a:fld id="{764FC402-F86F-7E47-81B8-16B12E4887E4}" type="datetimeFigureOut">
               <a:rPr lang="en-US" smtClean="0"/>
-              <a:t>4/10/17</a:t>
+              <a:t>4/11/17</a:t>
             </a:fld>
             <a:endParaRPr lang="en-US"/>
           </a:p>
@@ -1267,7 +1269,7 @@
           <a:p>
             <a:fld id="{764FC402-F86F-7E47-81B8-16B12E4887E4}" type="datetimeFigureOut">
               <a:rPr lang="en-US" smtClean="0"/>
-              <a:t>4/10/17</a:t>
+              <a:t>4/11/17</a:t>
             </a:fld>
             <a:endParaRPr lang="en-US"/>
           </a:p>
@@ -1450,7 +1452,7 @@
           <a:p>
             <a:fld id="{764FC402-F86F-7E47-81B8-16B12E4887E4}" type="datetimeFigureOut">
               <a:rPr lang="en-US" smtClean="0"/>
-              <a:t>4/10/17</a:t>
+              <a:t>4/11/17</a:t>
             </a:fld>
             <a:endParaRPr lang="en-US"/>
           </a:p>
@@ -1779,7 +1781,7 @@
           <a:p>
             <a:fld id="{764FC402-F86F-7E47-81B8-16B12E4887E4}" type="datetimeFigureOut">
               <a:rPr lang="en-US" smtClean="0"/>
-              <a:t>4/10/17</a:t>
+              <a:t>4/11/17</a:t>
             </a:fld>
             <a:endParaRPr lang="en-US"/>
           </a:p>
@@ -2067,7 +2069,7 @@
           <a:p>
             <a:fld id="{764FC402-F86F-7E47-81B8-16B12E4887E4}" type="datetimeFigureOut">
               <a:rPr lang="en-US" smtClean="0"/>
-              <a:t>4/10/17</a:t>
+              <a:t>4/11/17</a:t>
             </a:fld>
             <a:endParaRPr lang="en-US"/>
           </a:p>
@@ -2489,7 +2491,7 @@
           <a:p>
             <a:fld id="{764FC402-F86F-7E47-81B8-16B12E4887E4}" type="datetimeFigureOut">
               <a:rPr lang="en-US" smtClean="0"/>
-              <a:t>4/10/17</a:t>
+              <a:t>4/11/17</a:t>
             </a:fld>
             <a:endParaRPr lang="en-US"/>
           </a:p>
@@ -2607,7 +2609,7 @@
           <a:p>
             <a:fld id="{764FC402-F86F-7E47-81B8-16B12E4887E4}" type="datetimeFigureOut">
               <a:rPr lang="en-US" smtClean="0"/>
-              <a:t>4/10/17</a:t>
+              <a:t>4/11/17</a:t>
             </a:fld>
             <a:endParaRPr lang="en-US"/>
           </a:p>
@@ -2702,7 +2704,7 @@
           <a:p>
             <a:fld id="{764FC402-F86F-7E47-81B8-16B12E4887E4}" type="datetimeFigureOut">
               <a:rPr lang="en-US" smtClean="0"/>
-              <a:t>4/10/17</a:t>
+              <a:t>4/11/17</a:t>
             </a:fld>
             <a:endParaRPr lang="en-US"/>
           </a:p>
@@ -2979,7 +2981,7 @@
           <a:p>
             <a:fld id="{764FC402-F86F-7E47-81B8-16B12E4887E4}" type="datetimeFigureOut">
               <a:rPr lang="en-US" smtClean="0"/>
-              <a:t>4/10/17</a:t>
+              <a:t>4/11/17</a:t>
             </a:fld>
             <a:endParaRPr lang="en-US"/>
           </a:p>
@@ -3232,7 +3234,7 @@
           <a:p>
             <a:fld id="{764FC402-F86F-7E47-81B8-16B12E4887E4}" type="datetimeFigureOut">
               <a:rPr lang="en-US" smtClean="0"/>
-              <a:t>4/10/17</a:t>
+              <a:t>4/11/17</a:t>
             </a:fld>
             <a:endParaRPr lang="en-US"/>
           </a:p>
@@ -3446,7 +3448,7 @@
             <a:fld id="{764FC402-F86F-7E47-81B8-16B12E4887E4}" type="datetimeFigureOut">
               <a:rPr lang="en-US" smtClean="0"/>
               <a:pPr/>
-              <a:t>4/10/17</a:t>
+              <a:t>4/11/17</a:t>
             </a:fld>
             <a:endParaRPr lang="en-US"/>
           </a:p>
@@ -3848,23 +3850,7 @@
                   <a:schemeClr val="tx1"/>
                 </a:solidFill>
               </a:rPr>
-              <a:t>April 13</a:t>
-            </a:r>
-            <a:r>
-              <a:rPr lang="en-US" dirty="0" smtClean="0">
-                <a:solidFill>
-                  <a:schemeClr val="tx1"/>
-                </a:solidFill>
-              </a:rPr>
-              <a:t>, </a:t>
-            </a:r>
-            <a:r>
-              <a:rPr lang="en-US" dirty="0" smtClean="0">
-                <a:solidFill>
-                  <a:schemeClr val="tx1"/>
-                </a:solidFill>
-              </a:rPr>
-              <a:t>2017</a:t>
+              <a:t>April 13, 2017</a:t>
             </a:r>
           </a:p>
         </p:txBody>
@@ -3903,6 +3889,104 @@
     <p:extLst>
       <p:ext uri="{BB962C8B-B14F-4D97-AF65-F5344CB8AC3E}">
         <p14:creationId xmlns:p14="http://schemas.microsoft.com/office/powerpoint/2010/main" val="437539543"/>
+      </p:ext>
+    </p:extLst>
+  </p:cSld>
+  <p:clrMapOvr>
+    <a:masterClrMapping/>
+  </p:clrMapOvr>
+  <p:timing>
+    <p:tnLst>
+      <p:par>
+        <p:cTn xmlns:p14="http://schemas.microsoft.com/office/powerpoint/2010/main" id="1" dur="indefinite" restart="never" nodeType="tmRoot"/>
+      </p:par>
+    </p:tnLst>
+  </p:timing>
+</p:sld>
+</file>
+
+<file path=ppt/slides/slide10.xml><?xml version="1.0" encoding="utf-8"?>
+<p:sld xmlns:a="http://schemas.openxmlformats.org/drawingml/2006/main" xmlns:r="http://schemas.openxmlformats.org/officeDocument/2006/relationships" xmlns:p="http://schemas.openxmlformats.org/presentationml/2006/main">
+  <p:cSld>
+    <p:spTree>
+      <p:nvGrpSpPr>
+        <p:cNvPr id="1" name=""/>
+        <p:cNvGrpSpPr/>
+        <p:nvPr/>
+      </p:nvGrpSpPr>
+      <p:grpSpPr>
+        <a:xfrm>
+          <a:off x="0" y="0"/>
+          <a:ext cx="0" cy="0"/>
+          <a:chOff x="0" y="0"/>
+          <a:chExt cx="0" cy="0"/>
+        </a:xfrm>
+      </p:grpSpPr>
+      <p:sp>
+        <p:nvSpPr>
+          <p:cNvPr id="3" name="Subtitle 2"/>
+          <p:cNvSpPr>
+            <a:spLocks noGrp="1"/>
+          </p:cNvSpPr>
+          <p:nvPr>
+            <p:ph type="subTitle" idx="1"/>
+          </p:nvPr>
+        </p:nvSpPr>
+        <p:spPr>
+          <a:xfrm>
+            <a:off x="1371600" y="4762500"/>
+            <a:ext cx="6400800" cy="1752600"/>
+          </a:xfrm>
+        </p:spPr>
+        <p:txBody>
+          <a:bodyPr/>
+          <a:lstStyle/>
+          <a:p>
+            <a:r>
+              <a:rPr lang="en-US" dirty="0" smtClean="0">
+                <a:solidFill>
+                  <a:schemeClr val="tx1"/>
+                </a:solidFill>
+              </a:rPr>
+              <a:t>April 13, 2017</a:t>
+            </a:r>
+          </a:p>
+        </p:txBody>
+      </p:sp>
+      <p:pic>
+        <p:nvPicPr>
+          <p:cNvPr id="5" name="Picture 4" descr="PyDataLogoAnnArbor.png"/>
+          <p:cNvPicPr>
+            <a:picLocks noChangeAspect="1"/>
+          </p:cNvPicPr>
+          <p:nvPr/>
+        </p:nvPicPr>
+        <p:blipFill>
+          <a:blip r:embed="rId2">
+            <a:extLst>
+              <a:ext uri="{28A0092B-C50C-407E-A947-70E740481C1C}">
+                <a14:useLocalDpi xmlns:a14="http://schemas.microsoft.com/office/drawing/2010/main" val="0"/>
+              </a:ext>
+            </a:extLst>
+          </a:blip>
+          <a:stretch>
+            <a:fillRect/>
+          </a:stretch>
+        </p:blipFill>
+        <p:spPr>
+          <a:xfrm>
+            <a:off x="685800" y="217020"/>
+            <a:ext cx="7772400" cy="3886200"/>
+          </a:xfrm>
+          <a:prstGeom prst="rect">
+            <a:avLst/>
+          </a:prstGeom>
+        </p:spPr>
+      </p:pic>
+    </p:spTree>
+    <p:extLst>
+      <p:ext uri="{BB962C8B-B14F-4D97-AF65-F5344CB8AC3E}">
+        <p14:creationId xmlns:p14="http://schemas.microsoft.com/office/powerpoint/2010/main" val="1439401325"/>
       </p:ext>
     </p:extLst>
   </p:cSld>
@@ -4837,54 +4921,127 @@
       </p:grpSpPr>
       <p:sp>
         <p:nvSpPr>
-          <p:cNvPr id="3" name="Subtitle 2"/>
-          <p:cNvSpPr>
-            <a:spLocks noGrp="1"/>
-          </p:cNvSpPr>
-          <p:nvPr>
-            <p:ph type="subTitle" idx="1"/>
-          </p:nvPr>
-        </p:nvSpPr>
+          <p:cNvPr id="2" name="Title 1"/>
+          <p:cNvSpPr>
+            <a:spLocks noGrp="1"/>
+          </p:cNvSpPr>
+          <p:nvPr>
+            <p:ph type="title"/>
+          </p:nvPr>
+        </p:nvSpPr>
+        <p:spPr/>
+        <p:txBody>
+          <a:bodyPr/>
+          <a:lstStyle/>
+          <a:p>
+            <a:r>
+              <a:rPr lang="en-US" dirty="0" smtClean="0"/>
+              <a:t>Tweet @</a:t>
+            </a:r>
+            <a:r>
+              <a:rPr lang="en-US" dirty="0" err="1" smtClean="0"/>
+              <a:t>PyDataAnnArbor</a:t>
+            </a:r>
+            <a:endParaRPr lang="en-US" dirty="0"/>
+          </a:p>
+        </p:txBody>
+      </p:sp>
+      <p:pic>
+        <p:nvPicPr>
+          <p:cNvPr id="4" name="Picture 3" descr="Screen Shot 2017-04-11 at 11.19.10 AM.png"/>
+          <p:cNvPicPr>
+            <a:picLocks noChangeAspect="1"/>
+          </p:cNvPicPr>
+          <p:nvPr/>
+        </p:nvPicPr>
+        <p:blipFill rotWithShape="1">
+          <a:blip r:embed="rId2">
+            <a:extLst>
+              <a:ext uri="{28A0092B-C50C-407E-A947-70E740481C1C}">
+                <a14:useLocalDpi xmlns:a14="http://schemas.microsoft.com/office/drawing/2010/main" val="0"/>
+              </a:ext>
+            </a:extLst>
+          </a:blip>
+          <a:srcRect l="3221" t="16186" r="3573" b="9745"/>
+          <a:stretch/>
+        </p:blipFill>
         <p:spPr>
           <a:xfrm>
-            <a:off x="1371600" y="4762500"/>
-            <a:ext cx="6400800" cy="1752600"/>
+            <a:off x="349746" y="1435561"/>
+            <a:ext cx="8522742" cy="4233050"/>
           </a:xfrm>
+          <a:prstGeom prst="rect">
+            <a:avLst/>
+          </a:prstGeom>
         </p:spPr>
+      </p:pic>
+    </p:spTree>
+    <p:extLst>
+      <p:ext uri="{BB962C8B-B14F-4D97-AF65-F5344CB8AC3E}">
+        <p14:creationId xmlns:p14="http://schemas.microsoft.com/office/powerpoint/2010/main" val="4180885766"/>
+      </p:ext>
+    </p:extLst>
+  </p:cSld>
+  <p:clrMapOvr>
+    <a:masterClrMapping/>
+  </p:clrMapOvr>
+  <p:timing>
+    <p:tnLst>
+      <p:par>
+        <p:cTn xmlns:p14="http://schemas.microsoft.com/office/powerpoint/2010/main" id="1" dur="indefinite" restart="never" nodeType="tmRoot"/>
+      </p:par>
+    </p:tnLst>
+  </p:timing>
+</p:sld>
+</file>
+
+<file path=ppt/slides/slide9.xml><?xml version="1.0" encoding="utf-8"?>
+<p:sld xmlns:a="http://schemas.openxmlformats.org/drawingml/2006/main" xmlns:r="http://schemas.openxmlformats.org/officeDocument/2006/relationships" xmlns:p="http://schemas.openxmlformats.org/presentationml/2006/main">
+  <p:cSld>
+    <p:spTree>
+      <p:nvGrpSpPr>
+        <p:cNvPr id="1" name=""/>
+        <p:cNvGrpSpPr/>
+        <p:nvPr/>
+      </p:nvGrpSpPr>
+      <p:grpSpPr>
+        <a:xfrm>
+          <a:off x="0" y="0"/>
+          <a:ext cx="0" cy="0"/>
+          <a:chOff x="0" y="0"/>
+          <a:chExt cx="0" cy="0"/>
+        </a:xfrm>
+      </p:grpSpPr>
+      <p:sp>
+        <p:nvSpPr>
+          <p:cNvPr id="2" name="Title 1"/>
+          <p:cNvSpPr>
+            <a:spLocks noGrp="1"/>
+          </p:cNvSpPr>
+          <p:nvPr>
+            <p:ph type="title"/>
+          </p:nvPr>
+        </p:nvSpPr>
+        <p:spPr/>
         <p:txBody>
           <a:bodyPr/>
           <a:lstStyle/>
           <a:p>
             <a:r>
-              <a:rPr lang="en-US" dirty="0" smtClean="0">
-                <a:solidFill>
-                  <a:schemeClr val="tx1"/>
-                </a:solidFill>
-              </a:rPr>
-              <a:t>April 13</a:t>
-            </a:r>
-            <a:r>
-              <a:rPr lang="en-US" dirty="0" smtClean="0">
-                <a:solidFill>
-                  <a:schemeClr val="tx1"/>
-                </a:solidFill>
-              </a:rPr>
-              <a:t>, </a:t>
-            </a:r>
-            <a:r>
-              <a:rPr lang="en-US" dirty="0" smtClean="0">
-                <a:solidFill>
-                  <a:schemeClr val="tx1"/>
-                </a:solidFill>
-              </a:rPr>
-              <a:t>2017</a:t>
-            </a:r>
+              <a:rPr lang="en-US" dirty="0" err="1" smtClean="0"/>
+              <a:t>Scikit</a:t>
+            </a:r>
+            <a:r>
+              <a:rPr lang="en-US" dirty="0" smtClean="0"/>
+              <a:t>-Learn Workshop</a:t>
+            </a:r>
+            <a:endParaRPr lang="en-US" dirty="0"/>
           </a:p>
         </p:txBody>
       </p:sp>
       <p:pic>
         <p:nvPicPr>
-          <p:cNvPr id="5" name="Picture 4" descr="PyDataLogoAnnArbor.png"/>
+          <p:cNvPr id="3" name="Picture 2" descr="photo.png"/>
           <p:cNvPicPr>
             <a:picLocks noChangeAspect="1"/>
           </p:cNvPicPr>
@@ -4904,8 +5061,82 @@
         </p:blipFill>
         <p:spPr>
           <a:xfrm>
-            <a:off x="685800" y="217020"/>
-            <a:ext cx="7772400" cy="3886200"/>
+            <a:off x="825481" y="1819052"/>
+            <a:ext cx="3251200" cy="3251200"/>
+          </a:xfrm>
+          <a:prstGeom prst="rect">
+            <a:avLst/>
+          </a:prstGeom>
+        </p:spPr>
+      </p:pic>
+      <p:sp>
+        <p:nvSpPr>
+          <p:cNvPr id="5" name="TextBox 4"/>
+          <p:cNvSpPr txBox="1"/>
+          <p:nvPr/>
+        </p:nvSpPr>
+        <p:spPr>
+          <a:xfrm>
+            <a:off x="1283382" y="5143870"/>
+            <a:ext cx="2329672" cy="369332"/>
+          </a:xfrm>
+          <a:prstGeom prst="rect">
+            <a:avLst/>
+          </a:prstGeom>
+          <a:noFill/>
+        </p:spPr>
+        <p:txBody>
+          <a:bodyPr wrap="none" rtlCol="0">
+            <a:spAutoFit/>
+          </a:bodyPr>
+          <a:lstStyle/>
+          <a:p>
+            <a:pPr algn="ctr"/>
+            <a:r>
+              <a:rPr lang="en-US" b="1" dirty="0" smtClean="0">
+                <a:latin typeface="Open Sans"/>
+                <a:cs typeface="Open Sans"/>
+              </a:rPr>
+              <a:t>Sebastian </a:t>
+            </a:r>
+            <a:r>
+              <a:rPr lang="en-US" b="1" dirty="0" err="1" smtClean="0">
+                <a:latin typeface="Open Sans"/>
+                <a:cs typeface="Open Sans"/>
+              </a:rPr>
+              <a:t>Raschka</a:t>
+            </a:r>
+            <a:endParaRPr lang="en-US" b="1" dirty="0">
+              <a:latin typeface="Open Sans"/>
+              <a:cs typeface="Open Sans"/>
+            </a:endParaRPr>
+          </a:p>
+        </p:txBody>
+      </p:sp>
+      <p:pic>
+        <p:nvPicPr>
+          <p:cNvPr id="6" name="Picture 5" descr="51a+9LUynLL.jpg"/>
+          <p:cNvPicPr>
+            <a:picLocks noChangeAspect="1"/>
+          </p:cNvPicPr>
+          <p:nvPr/>
+        </p:nvPicPr>
+        <p:blipFill>
+          <a:blip r:embed="rId3">
+            <a:extLst>
+              <a:ext uri="{28A0092B-C50C-407E-A947-70E740481C1C}">
+                <a14:useLocalDpi xmlns:a14="http://schemas.microsoft.com/office/drawing/2010/main" val="0"/>
+              </a:ext>
+            </a:extLst>
+          </a:blip>
+          <a:stretch>
+            <a:fillRect/>
+          </a:stretch>
+        </p:blipFill>
+        <p:spPr>
+          <a:xfrm>
+            <a:off x="4859620" y="1417638"/>
+            <a:ext cx="3480075" cy="4285807"/>
           </a:xfrm>
           <a:prstGeom prst="rect">
             <a:avLst/>
@@ -4915,7 +5146,7 @@
     </p:spTree>
     <p:extLst>
       <p:ext uri="{BB962C8B-B14F-4D97-AF65-F5344CB8AC3E}">
-        <p14:creationId xmlns:p14="http://schemas.microsoft.com/office/powerpoint/2010/main" val="1439401325"/>
+        <p14:creationId xmlns:p14="http://schemas.microsoft.com/office/powerpoint/2010/main" val="3024806917"/>
       </p:ext>
     </p:extLst>
   </p:cSld>

</xml_diff>

<commit_message>
Added link to Deepmind Sonnet
</commit_message>
<xml_diff>
--- a/talks/20170413/20170413-PyDataIntro.pptx
+++ b/talks/20170413/20170413-PyDataIntro.pptx
@@ -4882,6 +4882,53 @@
           </a:prstGeom>
         </p:spPr>
       </p:pic>
+      <p:sp>
+        <p:nvSpPr>
+          <p:cNvPr id="4" name="TextBox 3"/>
+          <p:cNvSpPr txBox="1"/>
+          <p:nvPr/>
+        </p:nvSpPr>
+        <p:spPr>
+          <a:xfrm>
+            <a:off x="189660" y="5058545"/>
+            <a:ext cx="8738290" cy="523220"/>
+          </a:xfrm>
+          <a:prstGeom prst="rect">
+            <a:avLst/>
+          </a:prstGeom>
+          <a:noFill/>
+        </p:spPr>
+        <p:txBody>
+          <a:bodyPr wrap="none" rtlCol="0">
+            <a:spAutoFit/>
+          </a:bodyPr>
+          <a:lstStyle/>
+          <a:p>
+            <a:pPr algn="ctr"/>
+            <a:r>
+              <a:rPr lang="en-US" sz="2800" dirty="0">
+                <a:latin typeface="Open Sans"/>
+                <a:cs typeface="Open Sans"/>
+              </a:rPr>
+              <a:t>https://</a:t>
+            </a:r>
+            <a:r>
+              <a:rPr lang="en-US" sz="2800" dirty="0" err="1">
+                <a:latin typeface="Open Sans"/>
+                <a:cs typeface="Open Sans"/>
+              </a:rPr>
+              <a:t>deepmind.com</a:t>
+            </a:r>
+            <a:r>
+              <a:rPr lang="en-US" sz="2800" dirty="0">
+                <a:latin typeface="Open Sans"/>
+                <a:cs typeface="Open Sans"/>
+              </a:rPr>
+              <a:t>/blog/open-sourcing-sonnet/</a:t>
+            </a:r>
+          </a:p>
+        </p:txBody>
+      </p:sp>
     </p:spTree>
     <p:extLst>
       <p:ext uri="{BB962C8B-B14F-4D97-AF65-F5344CB8AC3E}">

</xml_diff>

<commit_message>
Added slide for Michigan Python User Group
</commit_message>
<xml_diff>
--- a/talks/20170413/20170413-PyDataIntro.pptx
+++ b/talks/20170413/20170413-PyDataIntro.pptx
@@ -5,10 +5,10 @@
     <p:sldMasterId id="2147483648" r:id="rId1"/>
   </p:sldMasterIdLst>
   <p:notesMasterIdLst>
-    <p:notesMasterId r:id="rId12"/>
+    <p:notesMasterId r:id="rId13"/>
   </p:notesMasterIdLst>
   <p:handoutMasterIdLst>
-    <p:handoutMasterId r:id="rId13"/>
+    <p:handoutMasterId r:id="rId14"/>
   </p:handoutMasterIdLst>
   <p:sldIdLst>
     <p:sldId id="256" r:id="rId2"/>
@@ -20,7 +20,8 @@
     <p:sldId id="262" r:id="rId8"/>
     <p:sldId id="265" r:id="rId9"/>
     <p:sldId id="266" r:id="rId10"/>
-    <p:sldId id="264" r:id="rId11"/>
+    <p:sldId id="267" r:id="rId11"/>
+    <p:sldId id="264" r:id="rId12"/>
   </p:sldIdLst>
   <p:sldSz cx="9144000" cy="6858000" type="screen4x3"/>
   <p:notesSz cx="6858000" cy="9144000"/>
@@ -204,7 +205,7 @@
           <a:p>
             <a:fld id="{FEB69ECD-F9AB-FC4E-90AC-326AAAF914AC}" type="datetimeFigureOut">
               <a:rPr lang="en-US" smtClean="0"/>
-              <a:t>4/11/17</a:t>
+              <a:t>4/13/17</a:t>
             </a:fld>
             <a:endParaRPr lang="en-US"/>
           </a:p>
@@ -369,7 +370,7 @@
           <a:p>
             <a:fld id="{12EC9BAA-1B7E-A446-A2B3-00C89FDCBD52}" type="datetimeFigureOut">
               <a:rPr lang="en-US" smtClean="0"/>
-              <a:t>4/11/17</a:t>
+              <a:t>4/13/17</a:t>
             </a:fld>
             <a:endParaRPr lang="en-US"/>
           </a:p>
@@ -738,6 +739,94 @@
 </p:notes>
 </file>
 
+<file path=ppt/notesSlides/notesSlide2.xml><?xml version="1.0" encoding="utf-8"?>
+<p:notes xmlns:a="http://schemas.openxmlformats.org/drawingml/2006/main" xmlns:r="http://schemas.openxmlformats.org/officeDocument/2006/relationships" xmlns:p="http://schemas.openxmlformats.org/presentationml/2006/main">
+  <p:cSld>
+    <p:spTree>
+      <p:nvGrpSpPr>
+        <p:cNvPr id="1" name=""/>
+        <p:cNvGrpSpPr/>
+        <p:nvPr/>
+      </p:nvGrpSpPr>
+      <p:grpSpPr>
+        <a:xfrm>
+          <a:off x="0" y="0"/>
+          <a:ext cx="0" cy="0"/>
+          <a:chOff x="0" y="0"/>
+          <a:chExt cx="0" cy="0"/>
+        </a:xfrm>
+      </p:grpSpPr>
+      <p:sp>
+        <p:nvSpPr>
+          <p:cNvPr id="2" name="Slide Image Placeholder 1"/>
+          <p:cNvSpPr>
+            <a:spLocks noGrp="1" noRot="1" noChangeAspect="1"/>
+          </p:cNvSpPr>
+          <p:nvPr>
+            <p:ph type="sldImg"/>
+          </p:nvPr>
+        </p:nvSpPr>
+        <p:spPr/>
+      </p:sp>
+      <p:sp>
+        <p:nvSpPr>
+          <p:cNvPr id="3" name="Notes Placeholder 2"/>
+          <p:cNvSpPr>
+            <a:spLocks noGrp="1"/>
+          </p:cNvSpPr>
+          <p:nvPr>
+            <p:ph type="body" idx="1"/>
+          </p:nvPr>
+        </p:nvSpPr>
+        <p:spPr/>
+        <p:txBody>
+          <a:bodyPr/>
+          <a:lstStyle/>
+          <a:p>
+            <a:r>
+              <a:rPr lang="en-US" dirty="0" smtClean="0"/>
+              <a:t>Chuck Anderson</a:t>
+            </a:r>
+            <a:endParaRPr lang="en-US" dirty="0"/>
+          </a:p>
+        </p:txBody>
+      </p:sp>
+      <p:sp>
+        <p:nvSpPr>
+          <p:cNvPr id="4" name="Slide Number Placeholder 3"/>
+          <p:cNvSpPr>
+            <a:spLocks noGrp="1"/>
+          </p:cNvSpPr>
+          <p:nvPr>
+            <p:ph type="sldNum" sz="quarter" idx="10"/>
+          </p:nvPr>
+        </p:nvSpPr>
+        <p:spPr/>
+        <p:txBody>
+          <a:bodyPr/>
+          <a:lstStyle/>
+          <a:p>
+            <a:fld id="{B9CB6FE6-04A5-8B4E-85F5-152CE20686F5}" type="slidenum">
+              <a:rPr lang="en-US" smtClean="0"/>
+              <a:t>10</a:t>
+            </a:fld>
+            <a:endParaRPr lang="en-US"/>
+          </a:p>
+        </p:txBody>
+      </p:sp>
+    </p:spTree>
+    <p:extLst>
+      <p:ext uri="{BB962C8B-B14F-4D97-AF65-F5344CB8AC3E}">
+        <p14:creationId xmlns:p14="http://schemas.microsoft.com/office/powerpoint/2010/main" val="1818138579"/>
+      </p:ext>
+    </p:extLst>
+  </p:cSld>
+  <p:clrMapOvr>
+    <a:masterClrMapping/>
+  </p:clrMapOvr>
+</p:notes>
+</file>
+
 <file path=ppt/slideLayouts/slideLayout1.xml><?xml version="1.0" encoding="utf-8"?>
 <p:sldLayout xmlns:a="http://schemas.openxmlformats.org/drawingml/2006/main" xmlns:r="http://schemas.openxmlformats.org/officeDocument/2006/relationships" xmlns:p="http://schemas.openxmlformats.org/presentationml/2006/main" type="title" preserve="1">
   <p:cSld name="Title Slide">
@@ -919,7 +1008,7 @@
           <a:p>
             <a:fld id="{764FC402-F86F-7E47-81B8-16B12E4887E4}" type="datetimeFigureOut">
               <a:rPr lang="en-US" smtClean="0"/>
-              <a:t>4/11/17</a:t>
+              <a:t>4/13/17</a:t>
             </a:fld>
             <a:endParaRPr lang="en-US"/>
           </a:p>
@@ -1089,7 +1178,7 @@
           <a:p>
             <a:fld id="{764FC402-F86F-7E47-81B8-16B12E4887E4}" type="datetimeFigureOut">
               <a:rPr lang="en-US" smtClean="0"/>
-              <a:t>4/11/17</a:t>
+              <a:t>4/13/17</a:t>
             </a:fld>
             <a:endParaRPr lang="en-US"/>
           </a:p>
@@ -1269,7 +1358,7 @@
           <a:p>
             <a:fld id="{764FC402-F86F-7E47-81B8-16B12E4887E4}" type="datetimeFigureOut">
               <a:rPr lang="en-US" smtClean="0"/>
-              <a:t>4/11/17</a:t>
+              <a:t>4/13/17</a:t>
             </a:fld>
             <a:endParaRPr lang="en-US"/>
           </a:p>
@@ -1452,7 +1541,7 @@
           <a:p>
             <a:fld id="{764FC402-F86F-7E47-81B8-16B12E4887E4}" type="datetimeFigureOut">
               <a:rPr lang="en-US" smtClean="0"/>
-              <a:t>4/11/17</a:t>
+              <a:t>4/13/17</a:t>
             </a:fld>
             <a:endParaRPr lang="en-US"/>
           </a:p>
@@ -1781,7 +1870,7 @@
           <a:p>
             <a:fld id="{764FC402-F86F-7E47-81B8-16B12E4887E4}" type="datetimeFigureOut">
               <a:rPr lang="en-US" smtClean="0"/>
-              <a:t>4/11/17</a:t>
+              <a:t>4/13/17</a:t>
             </a:fld>
             <a:endParaRPr lang="en-US"/>
           </a:p>
@@ -2069,7 +2158,7 @@
           <a:p>
             <a:fld id="{764FC402-F86F-7E47-81B8-16B12E4887E4}" type="datetimeFigureOut">
               <a:rPr lang="en-US" smtClean="0"/>
-              <a:t>4/11/17</a:t>
+              <a:t>4/13/17</a:t>
             </a:fld>
             <a:endParaRPr lang="en-US"/>
           </a:p>
@@ -2491,7 +2580,7 @@
           <a:p>
             <a:fld id="{764FC402-F86F-7E47-81B8-16B12E4887E4}" type="datetimeFigureOut">
               <a:rPr lang="en-US" smtClean="0"/>
-              <a:t>4/11/17</a:t>
+              <a:t>4/13/17</a:t>
             </a:fld>
             <a:endParaRPr lang="en-US"/>
           </a:p>
@@ -2609,7 +2698,7 @@
           <a:p>
             <a:fld id="{764FC402-F86F-7E47-81B8-16B12E4887E4}" type="datetimeFigureOut">
               <a:rPr lang="en-US" smtClean="0"/>
-              <a:t>4/11/17</a:t>
+              <a:t>4/13/17</a:t>
             </a:fld>
             <a:endParaRPr lang="en-US"/>
           </a:p>
@@ -2704,7 +2793,7 @@
           <a:p>
             <a:fld id="{764FC402-F86F-7E47-81B8-16B12E4887E4}" type="datetimeFigureOut">
               <a:rPr lang="en-US" smtClean="0"/>
-              <a:t>4/11/17</a:t>
+              <a:t>4/13/17</a:t>
             </a:fld>
             <a:endParaRPr lang="en-US"/>
           </a:p>
@@ -2981,7 +3070,7 @@
           <a:p>
             <a:fld id="{764FC402-F86F-7E47-81B8-16B12E4887E4}" type="datetimeFigureOut">
               <a:rPr lang="en-US" smtClean="0"/>
-              <a:t>4/11/17</a:t>
+              <a:t>4/13/17</a:t>
             </a:fld>
             <a:endParaRPr lang="en-US"/>
           </a:p>
@@ -3234,7 +3323,7 @@
           <a:p>
             <a:fld id="{764FC402-F86F-7E47-81B8-16B12E4887E4}" type="datetimeFigureOut">
               <a:rPr lang="en-US" smtClean="0"/>
-              <a:t>4/11/17</a:t>
+              <a:t>4/13/17</a:t>
             </a:fld>
             <a:endParaRPr lang="en-US"/>
           </a:p>
@@ -3448,7 +3537,7 @@
             <a:fld id="{764FC402-F86F-7E47-81B8-16B12E4887E4}" type="datetimeFigureOut">
               <a:rPr lang="en-US" smtClean="0"/>
               <a:pPr/>
-              <a:t>4/11/17</a:t>
+              <a:t>4/13/17</a:t>
             </a:fld>
             <a:endParaRPr lang="en-US"/>
           </a:p>
@@ -3906,6 +3995,162 @@
 </file>
 
 <file path=ppt/slides/slide10.xml><?xml version="1.0" encoding="utf-8"?>
+<p:sld xmlns:a="http://schemas.openxmlformats.org/drawingml/2006/main" xmlns:r="http://schemas.openxmlformats.org/officeDocument/2006/relationships" xmlns:p="http://schemas.openxmlformats.org/presentationml/2006/main">
+  <p:cSld>
+    <p:spTree>
+      <p:nvGrpSpPr>
+        <p:cNvPr id="1" name=""/>
+        <p:cNvGrpSpPr/>
+        <p:nvPr/>
+      </p:nvGrpSpPr>
+      <p:grpSpPr>
+        <a:xfrm>
+          <a:off x="0" y="0"/>
+          <a:ext cx="0" cy="0"/>
+          <a:chOff x="0" y="0"/>
+          <a:chExt cx="0" cy="0"/>
+        </a:xfrm>
+      </p:grpSpPr>
+      <p:sp>
+        <p:nvSpPr>
+          <p:cNvPr id="2" name="Title 1"/>
+          <p:cNvSpPr>
+            <a:spLocks noGrp="1"/>
+          </p:cNvSpPr>
+          <p:nvPr>
+            <p:ph type="title"/>
+          </p:nvPr>
+        </p:nvSpPr>
+        <p:spPr/>
+        <p:txBody>
+          <a:bodyPr/>
+          <a:lstStyle/>
+          <a:p>
+            <a:r>
+              <a:rPr lang="en-US" dirty="0" smtClean="0"/>
+              <a:t>Michigan Python Users Group</a:t>
+            </a:r>
+            <a:endParaRPr lang="en-US" dirty="0"/>
+          </a:p>
+        </p:txBody>
+      </p:sp>
+      <p:sp>
+        <p:nvSpPr>
+          <p:cNvPr id="4" name="Rectangle 3"/>
+          <p:cNvSpPr/>
+          <p:nvPr/>
+        </p:nvSpPr>
+        <p:spPr>
+          <a:xfrm>
+            <a:off x="967860" y="1884990"/>
+            <a:ext cx="7619469" cy="3108544"/>
+          </a:xfrm>
+          <a:prstGeom prst="rect">
+            <a:avLst/>
+          </a:prstGeom>
+        </p:spPr>
+        <p:txBody>
+          <a:bodyPr wrap="none">
+            <a:spAutoFit/>
+          </a:bodyPr>
+          <a:lstStyle/>
+          <a:p>
+            <a:pPr algn="ctr"/>
+            <a:r>
+              <a:rPr lang="en-US" sz="2800" b="1" dirty="0">
+                <a:latin typeface="Open Sans"/>
+                <a:cs typeface="Open Sans"/>
+                <a:hlinkClick r:id="rId3"/>
+              </a:rPr>
+              <a:t>https://michipug.wordpress.com</a:t>
+            </a:r>
+            <a:r>
+              <a:rPr lang="en-US" sz="2800" b="1" dirty="0" smtClean="0">
+                <a:latin typeface="Open Sans"/>
+                <a:cs typeface="Open Sans"/>
+                <a:hlinkClick r:id="rId3"/>
+              </a:rPr>
+              <a:t>/</a:t>
+            </a:r>
+            <a:endParaRPr lang="en-US" sz="2800" b="1" dirty="0" smtClean="0">
+              <a:latin typeface="Open Sans"/>
+              <a:cs typeface="Open Sans"/>
+            </a:endParaRPr>
+          </a:p>
+          <a:p>
+            <a:pPr algn="ctr"/>
+            <a:endParaRPr lang="en-US" sz="2800" b="1" dirty="0">
+              <a:latin typeface="Open Sans"/>
+              <a:cs typeface="Open Sans"/>
+            </a:endParaRPr>
+          </a:p>
+          <a:p>
+            <a:pPr algn="ctr"/>
+            <a:r>
+              <a:rPr lang="en-US" sz="2800" b="1" dirty="0" smtClean="0">
+                <a:latin typeface="Open Sans"/>
+                <a:cs typeface="Open Sans"/>
+              </a:rPr>
+              <a:t>Date: First Thursday of Every Month</a:t>
+            </a:r>
+          </a:p>
+          <a:p>
+            <a:pPr algn="ctr"/>
+            <a:endParaRPr lang="en-US" sz="2800" b="1" dirty="0">
+              <a:latin typeface="Open Sans"/>
+              <a:cs typeface="Open Sans"/>
+            </a:endParaRPr>
+          </a:p>
+          <a:p>
+            <a:pPr algn="ctr"/>
+            <a:r>
+              <a:rPr lang="en-US" sz="2800" b="1" dirty="0" smtClean="0">
+                <a:latin typeface="Open Sans"/>
+                <a:cs typeface="Open Sans"/>
+              </a:rPr>
+              <a:t>Time: 7 PM</a:t>
+            </a:r>
+          </a:p>
+          <a:p>
+            <a:pPr algn="ctr"/>
+            <a:endParaRPr lang="en-US" sz="2800" b="1" dirty="0">
+              <a:latin typeface="Open Sans"/>
+              <a:cs typeface="Open Sans"/>
+            </a:endParaRPr>
+          </a:p>
+          <a:p>
+            <a:pPr algn="ctr"/>
+            <a:r>
+              <a:rPr lang="en-US" sz="2800" b="1" dirty="0" smtClean="0">
+                <a:latin typeface="Open Sans"/>
+                <a:cs typeface="Open Sans"/>
+              </a:rPr>
+              <a:t>Location: Washtenaw Community College</a:t>
+            </a:r>
+          </a:p>
+        </p:txBody>
+      </p:sp>
+    </p:spTree>
+    <p:extLst>
+      <p:ext uri="{BB962C8B-B14F-4D97-AF65-F5344CB8AC3E}">
+        <p14:creationId xmlns:p14="http://schemas.microsoft.com/office/powerpoint/2010/main" val="1697062278"/>
+      </p:ext>
+    </p:extLst>
+  </p:cSld>
+  <p:clrMapOvr>
+    <a:masterClrMapping/>
+  </p:clrMapOvr>
+  <p:timing>
+    <p:tnLst>
+      <p:par>
+        <p:cTn xmlns:p14="http://schemas.microsoft.com/office/powerpoint/2010/main" id="1" dur="indefinite" restart="never" nodeType="tmRoot"/>
+      </p:par>
+    </p:tnLst>
+  </p:timing>
+</p:sld>
+</file>
+
+<file path=ppt/slides/slide11.xml><?xml version="1.0" encoding="utf-8"?>
 <p:sld xmlns:a="http://schemas.openxmlformats.org/drawingml/2006/main" xmlns:r="http://schemas.openxmlformats.org/officeDocument/2006/relationships" xmlns:p="http://schemas.openxmlformats.org/presentationml/2006/main">
   <p:cSld>
     <p:spTree>

</xml_diff>